<commit_message>
add link to Parking Meters notebook
</commit_message>
<xml_diff>
--- a/Team32-Gold'nBlue.pptx
+++ b/Team32-Gold'nBlue.pptx
@@ -113,6 +113,11 @@
       </a:defRPr>
     </a:lvl9pPr>
   </p:defaultTextStyle>
+  <p:extLst>
+    <p:ext uri="{EFAFB233-063F-42B5-8137-9DF3F51BA10A}">
+      <p15:sldGuideLst xmlns:p15="http://schemas.microsoft.com/office/powerpoint/2012/main"/>
+    </p:ext>
+  </p:extLst>
 </p:presentation>
 </file>
 
@@ -263,7 +268,7 @@
           <a:p>
             <a:fld id="{8FFEE770-2B88-44F5-980C-C72CD534369C}" type="datetimeFigureOut">
               <a:rPr lang="en-US" smtClean="0"/>
-              <a:t>4/13/2024</a:t>
+              <a:t>4/15/2024</a:t>
             </a:fld>
             <a:endParaRPr lang="en-US"/>
           </a:p>
@@ -461,7 +466,7 @@
           <a:p>
             <a:fld id="{8FFEE770-2B88-44F5-980C-C72CD534369C}" type="datetimeFigureOut">
               <a:rPr lang="en-US" smtClean="0"/>
-              <a:t>4/13/2024</a:t>
+              <a:t>4/15/2024</a:t>
             </a:fld>
             <a:endParaRPr lang="en-US"/>
           </a:p>
@@ -669,7 +674,7 @@
           <a:p>
             <a:fld id="{8FFEE770-2B88-44F5-980C-C72CD534369C}" type="datetimeFigureOut">
               <a:rPr lang="en-US" smtClean="0"/>
-              <a:t>4/13/2024</a:t>
+              <a:t>4/15/2024</a:t>
             </a:fld>
             <a:endParaRPr lang="en-US"/>
           </a:p>
@@ -867,7 +872,7 @@
           <a:p>
             <a:fld id="{8FFEE770-2B88-44F5-980C-C72CD534369C}" type="datetimeFigureOut">
               <a:rPr lang="en-US" smtClean="0"/>
-              <a:t>4/13/2024</a:t>
+              <a:t>4/15/2024</a:t>
             </a:fld>
             <a:endParaRPr lang="en-US"/>
           </a:p>
@@ -1142,7 +1147,7 @@
           <a:p>
             <a:fld id="{8FFEE770-2B88-44F5-980C-C72CD534369C}" type="datetimeFigureOut">
               <a:rPr lang="en-US" smtClean="0"/>
-              <a:t>4/13/2024</a:t>
+              <a:t>4/15/2024</a:t>
             </a:fld>
             <a:endParaRPr lang="en-US"/>
           </a:p>
@@ -1407,7 +1412,7 @@
           <a:p>
             <a:fld id="{8FFEE770-2B88-44F5-980C-C72CD534369C}" type="datetimeFigureOut">
               <a:rPr lang="en-US" smtClean="0"/>
-              <a:t>4/13/2024</a:t>
+              <a:t>4/15/2024</a:t>
             </a:fld>
             <a:endParaRPr lang="en-US"/>
           </a:p>
@@ -1819,7 +1824,7 @@
           <a:p>
             <a:fld id="{8FFEE770-2B88-44F5-980C-C72CD534369C}" type="datetimeFigureOut">
               <a:rPr lang="en-US" smtClean="0"/>
-              <a:t>4/13/2024</a:t>
+              <a:t>4/15/2024</a:t>
             </a:fld>
             <a:endParaRPr lang="en-US"/>
           </a:p>
@@ -1960,7 +1965,7 @@
           <a:p>
             <a:fld id="{8FFEE770-2B88-44F5-980C-C72CD534369C}" type="datetimeFigureOut">
               <a:rPr lang="en-US" smtClean="0"/>
-              <a:t>4/13/2024</a:t>
+              <a:t>4/15/2024</a:t>
             </a:fld>
             <a:endParaRPr lang="en-US"/>
           </a:p>
@@ -2073,7 +2078,7 @@
           <a:p>
             <a:fld id="{8FFEE770-2B88-44F5-980C-C72CD534369C}" type="datetimeFigureOut">
               <a:rPr lang="en-US" smtClean="0"/>
-              <a:t>4/13/2024</a:t>
+              <a:t>4/15/2024</a:t>
             </a:fld>
             <a:endParaRPr lang="en-US"/>
           </a:p>
@@ -2384,7 +2389,7 @@
           <a:p>
             <a:fld id="{8FFEE770-2B88-44F5-980C-C72CD534369C}" type="datetimeFigureOut">
               <a:rPr lang="en-US" smtClean="0"/>
-              <a:t>4/13/2024</a:t>
+              <a:t>4/15/2024</a:t>
             </a:fld>
             <a:endParaRPr lang="en-US"/>
           </a:p>
@@ -2672,7 +2677,7 @@
           <a:p>
             <a:fld id="{8FFEE770-2B88-44F5-980C-C72CD534369C}" type="datetimeFigureOut">
               <a:rPr lang="en-US" smtClean="0"/>
-              <a:t>4/13/2024</a:t>
+              <a:t>4/15/2024</a:t>
             </a:fld>
             <a:endParaRPr lang="en-US"/>
           </a:p>
@@ -2918,7 +2923,7 @@
             <a:fld id="{8FFEE770-2B88-44F5-980C-C72CD534369C}" type="datetimeFigureOut">
               <a:rPr lang="en-US" smtClean="0"/>
               <a:pPr/>
-              <a:t>4/13/2024</a:t>
+              <a:t>4/15/2024</a:t>
             </a:fld>
             <a:endParaRPr lang="en-US"/>
           </a:p>
@@ -4104,7 +4109,7 @@
           <a:p>
             <a:r>
               <a:rPr lang="en-US" dirty="0"/>
-              <a:t>Parking Meters – Ranked by Neighborhood  </a:t>
+              <a:t>Parking Meters – Top 20 Neighborhoods</a:t>
             </a:r>
           </a:p>
         </p:txBody>
@@ -4181,6 +4186,57 @@
           </a:extLst>
         </p:spPr>
       </p:pic>
+      <p:sp>
+        <p:nvSpPr>
+          <p:cNvPr id="3" name="TextBox 2">
+            <a:extLst>
+              <a:ext uri="{FF2B5EF4-FFF2-40B4-BE49-F238E27FC236}">
+                <a16:creationId xmlns:a16="http://schemas.microsoft.com/office/drawing/2014/main" id="{7373F0AB-D0EB-488A-F8F7-1EE62B959CD8}"/>
+              </a:ext>
+            </a:extLst>
+          </p:cNvPr>
+          <p:cNvSpPr txBox="1"/>
+          <p:nvPr/>
+        </p:nvSpPr>
+        <p:spPr>
+          <a:xfrm>
+            <a:off x="4001729" y="2341292"/>
+            <a:ext cx="7864577" cy="523220"/>
+          </a:xfrm>
+          <a:prstGeom prst="rect">
+            <a:avLst/>
+          </a:prstGeom>
+          <a:noFill/>
+        </p:spPr>
+        <p:txBody>
+          <a:bodyPr wrap="square" rtlCol="0">
+            <a:spAutoFit/>
+          </a:bodyPr>
+          <a:lstStyle/>
+          <a:p>
+            <a:r>
+              <a:rPr lang="en-US" sz="2800" dirty="0">
+                <a:solidFill>
+                  <a:schemeClr val="tx2">
+                    <a:lumMod val="75000"/>
+                    <a:lumOff val="25000"/>
+                  </a:schemeClr>
+                </a:solidFill>
+                <a:hlinkClick r:id="rId3"/>
+              </a:rPr>
+              <a:t>To see how we got these results click here…</a:t>
+            </a:r>
+            <a:endParaRPr lang="en-US" sz="2800" dirty="0">
+              <a:solidFill>
+                <a:schemeClr val="tx2">
+                  <a:lumMod val="75000"/>
+                  <a:lumOff val="25000"/>
+                </a:schemeClr>
+              </a:solidFill>
+            </a:endParaRPr>
+          </a:p>
+        </p:txBody>
+      </p:sp>
     </p:spTree>
     <p:extLst>
       <p:ext uri="{BB962C8B-B14F-4D97-AF65-F5344CB8AC3E}">

</xml_diff>